<commit_message>
Ispravila MOF u prezentaciji
</commit_message>
<xml_diff>
--- a/docs/An Improved Current Loop Bandwidth and Axis Decoupling.pptx
+++ b/docs/An Improved Current Loop Bandwidth and Axis Decoupling.pptx
@@ -8833,7 +8833,7 @@
                 <a:ea typeface="Karla"/>
                 <a:sym typeface="Karla"/>
               </a:rPr>
-              <a:t>Comparison with analytical transfer function for UR=2 without MOF</a:t>
+              <a:t>Comparison with analytical transfer function for UR=2 without MAF</a:t>
             </a:r>
             <a:endParaRPr kumimoji="0" lang="en-US" sz="1600" b="0" i="0" u="none" strike="noStrike" kern="0" cap="none" spc="0" normalizeH="0" baseline="0" noProof="0" dirty="0" smtClean="0">
               <a:ln>
@@ -8903,7 +8903,7 @@
                   </a:schemeClr>
                 </a:solidFill>
               </a:rPr>
-              <a:t>Open loop FRA: UR=2, no MOF</a:t>
+              <a:t>Open loop FRA: UR=2, no MAF</a:t>
             </a:r>
             <a:endParaRPr lang="en-US" sz="1000" b="1" dirty="0">
               <a:solidFill>
@@ -8967,7 +8967,7 @@
                   </a:schemeClr>
                 </a:solidFill>
               </a:rPr>
-              <a:t>Open loop FRA: UR=8, no MOF</a:t>
+              <a:t>Open loop FRA: UR=8, no MAF</a:t>
             </a:r>
             <a:endParaRPr lang="en-US" sz="1000" b="1" dirty="0">
               <a:solidFill>
@@ -9031,7 +9031,7 @@
                   </a:schemeClr>
                 </a:solidFill>
               </a:rPr>
-              <a:t>Open loop FRA: UR=8, with MOF</a:t>
+              <a:t>Open loop FRA: UR=8, with MAF</a:t>
             </a:r>
             <a:endParaRPr lang="en-US" sz="1000" b="1" dirty="0">
               <a:solidFill>
@@ -9182,36 +9182,243 @@
           </a:p>
         </p:txBody>
       </p:sp>
-      <p:pic>
-        <p:nvPicPr>
-          <p:cNvPr id="13" name="Picture 12"/>
-          <p:cNvPicPr>
-            <a:picLocks noChangeAspect="1"/>
-          </p:cNvPicPr>
+      <p:grpSp>
+        <p:nvGrpSpPr>
+          <p:cNvPr id="17" name="Group 16"/>
+          <p:cNvGrpSpPr/>
           <p:nvPr/>
-        </p:nvPicPr>
-        <p:blipFill>
-          <a:blip r:embed="rId6">
-            <a:extLst>
-              <a:ext uri="{28A0092B-C50C-407E-A947-70E740481C1C}">
-                <a14:useLocalDpi xmlns:a14="http://schemas.microsoft.com/office/drawing/2010/main" val="0"/>
-              </a:ext>
-            </a:extLst>
-          </a:blip>
-          <a:stretch>
-            <a:fillRect/>
-          </a:stretch>
-        </p:blipFill>
-        <p:spPr>
+        </p:nvGrpSpPr>
+        <p:grpSpPr>
           <a:xfrm>
-            <a:off x="0" y="2967238"/>
+            <a:off x="0" y="2956493"/>
             <a:ext cx="11951014" cy="3165108"/>
+            <a:chOff x="0" y="2967238"/>
+            <a:chExt cx="11951014" cy="3165108"/>
           </a:xfrm>
-          <a:prstGeom prst="rect">
-            <a:avLst/>
-          </a:prstGeom>
-        </p:spPr>
-      </p:pic>
+        </p:grpSpPr>
+        <p:pic>
+          <p:nvPicPr>
+            <p:cNvPr id="13" name="Picture 12"/>
+            <p:cNvPicPr>
+              <a:picLocks noChangeAspect="1"/>
+            </p:cNvPicPr>
+            <p:nvPr/>
+          </p:nvPicPr>
+          <p:blipFill>
+            <a:blip r:embed="rId6">
+              <a:extLst>
+                <a:ext uri="{28A0092B-C50C-407E-A947-70E740481C1C}">
+                  <a14:useLocalDpi xmlns:a14="http://schemas.microsoft.com/office/drawing/2010/main" val="0"/>
+                </a:ext>
+              </a:extLst>
+            </a:blip>
+            <a:stretch>
+              <a:fillRect/>
+            </a:stretch>
+          </p:blipFill>
+          <p:spPr>
+            <a:xfrm>
+              <a:off x="0" y="2967238"/>
+              <a:ext cx="11951014" cy="3165108"/>
+            </a:xfrm>
+            <a:prstGeom prst="rect">
+              <a:avLst/>
+            </a:prstGeom>
+          </p:spPr>
+        </p:pic>
+        <p:sp>
+          <p:nvSpPr>
+            <p:cNvPr id="18" name="Rectangle 17"/>
+            <p:cNvSpPr/>
+            <p:nvPr/>
+          </p:nvSpPr>
+          <p:spPr>
+            <a:xfrm>
+              <a:off x="751168" y="3157622"/>
+              <a:ext cx="2888633" cy="179295"/>
+            </a:xfrm>
+            <a:prstGeom prst="rect">
+              <a:avLst/>
+            </a:prstGeom>
+            <a:solidFill>
+              <a:schemeClr val="bg1"/>
+            </a:solidFill>
+            <a:ln>
+              <a:noFill/>
+            </a:ln>
+          </p:spPr>
+          <p:style>
+            <a:lnRef idx="2">
+              <a:schemeClr val="accent1">
+                <a:shade val="50000"/>
+              </a:schemeClr>
+            </a:lnRef>
+            <a:fillRef idx="1">
+              <a:schemeClr val="accent1"/>
+            </a:fillRef>
+            <a:effectRef idx="0">
+              <a:schemeClr val="accent1"/>
+            </a:effectRef>
+            <a:fontRef idx="minor">
+              <a:schemeClr val="lt1"/>
+            </a:fontRef>
+          </p:style>
+          <p:txBody>
+            <a:bodyPr rtlCol="0" anchor="ctr"/>
+            <a:lstStyle/>
+            <a:p>
+              <a:pPr algn="ctr"/>
+              <a:r>
+                <a:rPr lang="en-US" sz="1000" b="1" dirty="0" smtClean="0">
+                  <a:solidFill>
+                    <a:schemeClr val="tx1">
+                      <a:lumMod val="75000"/>
+                      <a:lumOff val="25000"/>
+                    </a:schemeClr>
+                  </a:solidFill>
+                </a:rPr>
+                <a:t>Closed loop FRA: UR=2, no MAF</a:t>
+              </a:r>
+              <a:endParaRPr lang="en-US" sz="1000" b="1" dirty="0">
+                <a:solidFill>
+                  <a:schemeClr val="tx1">
+                    <a:lumMod val="75000"/>
+                    <a:lumOff val="25000"/>
+                  </a:schemeClr>
+                </a:solidFill>
+              </a:endParaRPr>
+            </a:p>
+          </p:txBody>
+        </p:sp>
+        <p:sp>
+          <p:nvSpPr>
+            <p:cNvPr id="19" name="Rectangle 18"/>
+            <p:cNvSpPr/>
+            <p:nvPr/>
+          </p:nvSpPr>
+          <p:spPr>
+            <a:xfrm>
+              <a:off x="4511068" y="3165607"/>
+              <a:ext cx="2888633" cy="179295"/>
+            </a:xfrm>
+            <a:prstGeom prst="rect">
+              <a:avLst/>
+            </a:prstGeom>
+            <a:solidFill>
+              <a:schemeClr val="bg1"/>
+            </a:solidFill>
+            <a:ln>
+              <a:noFill/>
+            </a:ln>
+          </p:spPr>
+          <p:style>
+            <a:lnRef idx="2">
+              <a:schemeClr val="accent1">
+                <a:shade val="50000"/>
+              </a:schemeClr>
+            </a:lnRef>
+            <a:fillRef idx="1">
+              <a:schemeClr val="accent1"/>
+            </a:fillRef>
+            <a:effectRef idx="0">
+              <a:schemeClr val="accent1"/>
+            </a:effectRef>
+            <a:fontRef idx="minor">
+              <a:schemeClr val="lt1"/>
+            </a:fontRef>
+          </p:style>
+          <p:txBody>
+            <a:bodyPr rtlCol="0" anchor="ctr"/>
+            <a:lstStyle/>
+            <a:p>
+              <a:pPr algn="ctr"/>
+              <a:r>
+                <a:rPr lang="en-US" sz="1000" b="1" dirty="0" smtClean="0">
+                  <a:solidFill>
+                    <a:schemeClr val="tx1">
+                      <a:lumMod val="75000"/>
+                      <a:lumOff val="25000"/>
+                    </a:schemeClr>
+                  </a:solidFill>
+                </a:rPr>
+                <a:t>Closed loop FRA: UR=8, no MAF</a:t>
+              </a:r>
+              <a:endParaRPr lang="en-US" sz="1000" b="1" dirty="0">
+                <a:solidFill>
+                  <a:schemeClr val="tx1">
+                    <a:lumMod val="75000"/>
+                    <a:lumOff val="25000"/>
+                  </a:schemeClr>
+                </a:solidFill>
+              </a:endParaRPr>
+            </a:p>
+          </p:txBody>
+        </p:sp>
+        <p:sp>
+          <p:nvSpPr>
+            <p:cNvPr id="20" name="Rectangle 19"/>
+            <p:cNvSpPr/>
+            <p:nvPr/>
+          </p:nvSpPr>
+          <p:spPr>
+            <a:xfrm>
+              <a:off x="8289112" y="3173594"/>
+              <a:ext cx="2888633" cy="179295"/>
+            </a:xfrm>
+            <a:prstGeom prst="rect">
+              <a:avLst/>
+            </a:prstGeom>
+            <a:solidFill>
+              <a:schemeClr val="bg1"/>
+            </a:solidFill>
+            <a:ln>
+              <a:noFill/>
+            </a:ln>
+          </p:spPr>
+          <p:style>
+            <a:lnRef idx="2">
+              <a:schemeClr val="accent1">
+                <a:shade val="50000"/>
+              </a:schemeClr>
+            </a:lnRef>
+            <a:fillRef idx="1">
+              <a:schemeClr val="accent1"/>
+            </a:fillRef>
+            <a:effectRef idx="0">
+              <a:schemeClr val="accent1"/>
+            </a:effectRef>
+            <a:fontRef idx="minor">
+              <a:schemeClr val="lt1"/>
+            </a:fontRef>
+          </p:style>
+          <p:txBody>
+            <a:bodyPr rtlCol="0" anchor="ctr"/>
+            <a:lstStyle/>
+            <a:p>
+              <a:pPr algn="ctr"/>
+              <a:r>
+                <a:rPr lang="en-US" sz="1000" b="1" dirty="0" smtClean="0">
+                  <a:solidFill>
+                    <a:schemeClr val="tx1">
+                      <a:lumMod val="75000"/>
+                      <a:lumOff val="25000"/>
+                    </a:schemeClr>
+                  </a:solidFill>
+                </a:rPr>
+                <a:t>Closed loop FRA: UR=8, with MAF</a:t>
+              </a:r>
+              <a:endParaRPr lang="en-US" sz="1000" b="1" dirty="0">
+                <a:solidFill>
+                  <a:schemeClr val="tx1">
+                    <a:lumMod val="75000"/>
+                    <a:lumOff val="25000"/>
+                  </a:schemeClr>
+                </a:solidFill>
+              </a:endParaRPr>
+            </a:p>
+          </p:txBody>
+        </p:sp>
+      </p:grpSp>
     </p:spTree>
     <p:extLst>
       <p:ext uri="{BB962C8B-B14F-4D97-AF65-F5344CB8AC3E}">
@@ -9355,7 +9562,7 @@
                                           </p:stCondLst>
                                         </p:cTn>
                                         <p:tgtEl>
-                                          <p:spTgt spid="13"/>
+                                          <p:spTgt spid="17"/>
                                         </p:tgtEl>
                                         <p:attrNameLst>
                                           <p:attrName>style.visibility</p:attrName>
@@ -9874,66 +10081,6 @@
           </a:prstGeom>
         </p:spPr>
       </p:pic>
-      <p:pic>
-        <p:nvPicPr>
-          <p:cNvPr id="4" name="Picture 3"/>
-          <p:cNvPicPr>
-            <a:picLocks noChangeAspect="1"/>
-          </p:cNvPicPr>
-          <p:nvPr/>
-        </p:nvPicPr>
-        <p:blipFill>
-          <a:blip r:embed="rId5">
-            <a:extLst>
-              <a:ext uri="{28A0092B-C50C-407E-A947-70E740481C1C}">
-                <a14:useLocalDpi xmlns:a14="http://schemas.microsoft.com/office/drawing/2010/main" val="0"/>
-              </a:ext>
-            </a:extLst>
-          </a:blip>
-          <a:stretch>
-            <a:fillRect/>
-          </a:stretch>
-        </p:blipFill>
-        <p:spPr>
-          <a:xfrm>
-            <a:off x="8009410" y="956309"/>
-            <a:ext cx="3318390" cy="2488792"/>
-          </a:xfrm>
-          <a:prstGeom prst="rect">
-            <a:avLst/>
-          </a:prstGeom>
-        </p:spPr>
-      </p:pic>
-      <p:pic>
-        <p:nvPicPr>
-          <p:cNvPr id="5" name="Picture 4"/>
-          <p:cNvPicPr>
-            <a:picLocks noChangeAspect="1"/>
-          </p:cNvPicPr>
-          <p:nvPr/>
-        </p:nvPicPr>
-        <p:blipFill>
-          <a:blip r:embed="rId6">
-            <a:extLst>
-              <a:ext uri="{28A0092B-C50C-407E-A947-70E740481C1C}">
-                <a14:useLocalDpi xmlns:a14="http://schemas.microsoft.com/office/drawing/2010/main" val="0"/>
-              </a:ext>
-            </a:extLst>
-          </a:blip>
-          <a:stretch>
-            <a:fillRect/>
-          </a:stretch>
-        </p:blipFill>
-        <p:spPr>
-          <a:xfrm>
-            <a:off x="8009410" y="3528059"/>
-            <a:ext cx="3318390" cy="2488793"/>
-          </a:xfrm>
-          <a:prstGeom prst="rect">
-            <a:avLst/>
-          </a:prstGeom>
-        </p:spPr>
-      </p:pic>
       <p:graphicFrame>
         <p:nvGraphicFramePr>
           <p:cNvPr id="10" name="Table 9"/>
@@ -9943,7 +10090,7 @@
           <p:nvPr>
             <p:extLst>
               <p:ext uri="{D42A27DB-BD31-4B8C-83A1-F6EECF244321}">
-                <p14:modId xmlns:p14="http://schemas.microsoft.com/office/powerpoint/2010/main" val="2038242890"/>
+                <p14:modId xmlns:p14="http://schemas.microsoft.com/office/powerpoint/2010/main" val="3799136317"/>
               </p:ext>
             </p:extLst>
           </p:nvPr>
@@ -10135,15 +10282,22 @@
                     <a:p>
                       <a:pPr algn="l" fontAlgn="b"/>
                       <a:r>
-                        <a:rPr lang="en-US" sz="1300" b="1" i="0" u="none" strike="noStrike">
+                        <a:rPr lang="en-US" sz="1300" b="1" i="0" u="none" strike="noStrike" dirty="0" smtClean="0">
                           <a:solidFill>
                             <a:srgbClr val="000000"/>
                           </a:solidFill>
                           <a:effectLst/>
                           <a:latin typeface="Calibri" panose="020F0502020204030204" pitchFamily="34" charset="0"/>
                         </a:rPr>
-                        <a:t>MOF</a:t>
+                        <a:t>MAF</a:t>
                       </a:r>
+                      <a:endParaRPr lang="en-US" sz="1300" b="1" i="0" u="none" strike="noStrike" dirty="0">
+                        <a:solidFill>
+                          <a:srgbClr val="000000"/>
+                        </a:solidFill>
+                        <a:effectLst/>
+                        <a:latin typeface="Calibri" panose="020F0502020204030204" pitchFamily="34" charset="0"/>
+                      </a:endParaRPr>
                     </a:p>
                   </a:txBody>
                   <a:tcPr marL="11430" marR="11430" marT="11430" marB="0" anchor="b">
@@ -11035,6 +11189,286 @@
           </a:p>
         </p:txBody>
       </p:sp>
+      <p:grpSp>
+        <p:nvGrpSpPr>
+          <p:cNvPr id="13" name="Group 12"/>
+          <p:cNvGrpSpPr/>
+          <p:nvPr/>
+        </p:nvGrpSpPr>
+        <p:grpSpPr>
+          <a:xfrm>
+            <a:off x="8009410" y="956309"/>
+            <a:ext cx="3318390" cy="2488792"/>
+            <a:chOff x="8009410" y="956309"/>
+            <a:chExt cx="3318390" cy="2488792"/>
+          </a:xfrm>
+        </p:grpSpPr>
+        <p:pic>
+          <p:nvPicPr>
+            <p:cNvPr id="4" name="Picture 3"/>
+            <p:cNvPicPr>
+              <a:picLocks noChangeAspect="1"/>
+            </p:cNvPicPr>
+            <p:nvPr/>
+          </p:nvPicPr>
+          <p:blipFill>
+            <a:blip r:embed="rId5">
+              <a:extLst>
+                <a:ext uri="{28A0092B-C50C-407E-A947-70E740481C1C}">
+                  <a14:useLocalDpi xmlns:a14="http://schemas.microsoft.com/office/drawing/2010/main" val="0"/>
+                </a:ext>
+              </a:extLst>
+            </a:blip>
+            <a:stretch>
+              <a:fillRect/>
+            </a:stretch>
+          </p:blipFill>
+          <p:spPr>
+            <a:xfrm>
+              <a:off x="8009410" y="956309"/>
+              <a:ext cx="3318390" cy="2488792"/>
+            </a:xfrm>
+            <a:prstGeom prst="rect">
+              <a:avLst/>
+            </a:prstGeom>
+          </p:spPr>
+        </p:pic>
+        <p:sp>
+          <p:nvSpPr>
+            <p:cNvPr id="17" name="Rectangle 16"/>
+            <p:cNvSpPr/>
+            <p:nvPr/>
+          </p:nvSpPr>
+          <p:spPr>
+            <a:xfrm>
+              <a:off x="8345141" y="964238"/>
+              <a:ext cx="2888633" cy="179295"/>
+            </a:xfrm>
+            <a:prstGeom prst="rect">
+              <a:avLst/>
+            </a:prstGeom>
+            <a:solidFill>
+              <a:schemeClr val="bg1"/>
+            </a:solidFill>
+            <a:ln>
+              <a:noFill/>
+            </a:ln>
+          </p:spPr>
+          <p:style>
+            <a:lnRef idx="2">
+              <a:schemeClr val="accent1">
+                <a:shade val="50000"/>
+              </a:schemeClr>
+            </a:lnRef>
+            <a:fillRef idx="1">
+              <a:schemeClr val="accent1"/>
+            </a:fillRef>
+            <a:effectRef idx="0">
+              <a:schemeClr val="accent1"/>
+            </a:effectRef>
+            <a:fontRef idx="minor">
+              <a:schemeClr val="lt1"/>
+            </a:fontRef>
+          </p:style>
+          <p:txBody>
+            <a:bodyPr rtlCol="0" anchor="ctr"/>
+            <a:lstStyle/>
+            <a:p>
+              <a:pPr algn="ctr"/>
+              <a:r>
+                <a:rPr lang="en-US" sz="1000" b="1" dirty="0" smtClean="0">
+                  <a:solidFill>
+                    <a:schemeClr val="tx1">
+                      <a:lumMod val="75000"/>
+                      <a:lumOff val="25000"/>
+                    </a:schemeClr>
+                  </a:solidFill>
+                </a:rPr>
+                <a:t>HIL: UR=2 with MAF, </a:t>
+              </a:r>
+              <a:r>
+                <a:rPr lang="el-GR" sz="1000" b="1" i="0" u="none" strike="noStrike" dirty="0" smtClean="0">
+                  <a:solidFill>
+                    <a:srgbClr val="000000"/>
+                  </a:solidFill>
+                  <a:effectLst/>
+                  <a:latin typeface="Calibri" panose="020F0502020204030204" pitchFamily="34" charset="0"/>
+                </a:rPr>
+                <a:t>α</a:t>
+              </a:r>
+              <a:r>
+                <a:rPr lang="en-US" sz="1000" b="1" i="0" u="none" strike="noStrike" dirty="0" smtClean="0">
+                  <a:solidFill>
+                    <a:srgbClr val="000000"/>
+                  </a:solidFill>
+                  <a:effectLst/>
+                  <a:latin typeface="Calibri" panose="020F0502020204030204" pitchFamily="34" charset="0"/>
+                </a:rPr>
+                <a:t>=0.2</a:t>
+              </a:r>
+              <a:r>
+                <a:rPr lang="en-US" sz="1000" b="1" dirty="0" smtClean="0">
+                  <a:solidFill>
+                    <a:schemeClr val="tx1">
+                      <a:lumMod val="75000"/>
+                      <a:lumOff val="25000"/>
+                    </a:schemeClr>
+                  </a:solidFill>
+                </a:rPr>
+                <a:t> </a:t>
+              </a:r>
+              <a:endParaRPr lang="en-US" sz="1000" b="1" dirty="0">
+                <a:solidFill>
+                  <a:schemeClr val="tx1">
+                    <a:lumMod val="75000"/>
+                    <a:lumOff val="25000"/>
+                  </a:schemeClr>
+                </a:solidFill>
+              </a:endParaRPr>
+            </a:p>
+          </p:txBody>
+        </p:sp>
+      </p:grpSp>
+      <p:grpSp>
+        <p:nvGrpSpPr>
+          <p:cNvPr id="19" name="Group 18"/>
+          <p:cNvGrpSpPr/>
+          <p:nvPr/>
+        </p:nvGrpSpPr>
+        <p:grpSpPr>
+          <a:xfrm>
+            <a:off x="8009410" y="3528059"/>
+            <a:ext cx="3318390" cy="2488793"/>
+            <a:chOff x="8009410" y="3528059"/>
+            <a:chExt cx="3318390" cy="2488793"/>
+          </a:xfrm>
+        </p:grpSpPr>
+        <p:pic>
+          <p:nvPicPr>
+            <p:cNvPr id="5" name="Picture 4"/>
+            <p:cNvPicPr>
+              <a:picLocks noChangeAspect="1"/>
+            </p:cNvPicPr>
+            <p:nvPr/>
+          </p:nvPicPr>
+          <p:blipFill>
+            <a:blip r:embed="rId6">
+              <a:extLst>
+                <a:ext uri="{28A0092B-C50C-407E-A947-70E740481C1C}">
+                  <a14:useLocalDpi xmlns:a14="http://schemas.microsoft.com/office/drawing/2010/main" val="0"/>
+                </a:ext>
+              </a:extLst>
+            </a:blip>
+            <a:stretch>
+              <a:fillRect/>
+            </a:stretch>
+          </p:blipFill>
+          <p:spPr>
+            <a:xfrm>
+              <a:off x="8009410" y="3528059"/>
+              <a:ext cx="3318390" cy="2488793"/>
+            </a:xfrm>
+            <a:prstGeom prst="rect">
+              <a:avLst/>
+            </a:prstGeom>
+          </p:spPr>
+        </p:pic>
+        <p:sp>
+          <p:nvSpPr>
+            <p:cNvPr id="18" name="Rectangle 17"/>
+            <p:cNvSpPr/>
+            <p:nvPr/>
+          </p:nvSpPr>
+          <p:spPr>
+            <a:xfrm>
+              <a:off x="8297073" y="3528059"/>
+              <a:ext cx="2888633" cy="179295"/>
+            </a:xfrm>
+            <a:prstGeom prst="rect">
+              <a:avLst/>
+            </a:prstGeom>
+            <a:solidFill>
+              <a:schemeClr val="bg1"/>
+            </a:solidFill>
+            <a:ln>
+              <a:noFill/>
+            </a:ln>
+          </p:spPr>
+          <p:style>
+            <a:lnRef idx="2">
+              <a:schemeClr val="accent1">
+                <a:shade val="50000"/>
+              </a:schemeClr>
+            </a:lnRef>
+            <a:fillRef idx="1">
+              <a:schemeClr val="accent1"/>
+            </a:fillRef>
+            <a:effectRef idx="0">
+              <a:schemeClr val="accent1"/>
+            </a:effectRef>
+            <a:fontRef idx="minor">
+              <a:schemeClr val="lt1"/>
+            </a:fontRef>
+          </p:style>
+          <p:txBody>
+            <a:bodyPr rtlCol="0" anchor="ctr"/>
+            <a:lstStyle/>
+            <a:p>
+              <a:pPr algn="ctr"/>
+              <a:r>
+                <a:rPr lang="en-US" sz="1000" b="1" dirty="0" smtClean="0">
+                  <a:solidFill>
+                    <a:schemeClr val="tx1">
+                      <a:lumMod val="75000"/>
+                      <a:lumOff val="25000"/>
+                    </a:schemeClr>
+                  </a:solidFill>
+                </a:rPr>
+                <a:t>HIL: UR=8 with MAF, </a:t>
+              </a:r>
+              <a:r>
+                <a:rPr lang="el-GR" sz="1000" b="1" i="0" u="none" strike="noStrike" dirty="0" smtClean="0">
+                  <a:solidFill>
+                    <a:srgbClr val="000000"/>
+                  </a:solidFill>
+                  <a:effectLst/>
+                  <a:latin typeface="Calibri" panose="020F0502020204030204" pitchFamily="34" charset="0"/>
+                </a:rPr>
+                <a:t>α</a:t>
+              </a:r>
+              <a:r>
+                <a:rPr lang="en-US" sz="1000" b="1" i="0" u="none" strike="noStrike" dirty="0" smtClean="0">
+                  <a:solidFill>
+                    <a:srgbClr val="000000"/>
+                  </a:solidFill>
+                  <a:effectLst/>
+                  <a:latin typeface="Calibri" panose="020F0502020204030204" pitchFamily="34" charset="0"/>
+                </a:rPr>
+                <a:t>=0.087</a:t>
+              </a:r>
+              <a:r>
+                <a:rPr lang="en-US" sz="1000" b="1" dirty="0" smtClean="0">
+                  <a:solidFill>
+                    <a:schemeClr val="tx1">
+                      <a:lumMod val="75000"/>
+                      <a:lumOff val="25000"/>
+                    </a:schemeClr>
+                  </a:solidFill>
+                </a:rPr>
+                <a:t> </a:t>
+              </a:r>
+              <a:endParaRPr lang="en-US" sz="1000" b="1" dirty="0">
+                <a:solidFill>
+                  <a:schemeClr val="tx1">
+                    <a:lumMod val="75000"/>
+                    <a:lumOff val="25000"/>
+                  </a:schemeClr>
+                </a:solidFill>
+              </a:endParaRPr>
+            </a:p>
+          </p:txBody>
+        </p:sp>
+      </p:grpSp>
     </p:spTree>
     <p:extLst>
       <p:ext uri="{BB962C8B-B14F-4D97-AF65-F5344CB8AC3E}">
@@ -11079,7 +11513,7 @@
                                           </p:stCondLst>
                                         </p:cTn>
                                         <p:tgtEl>
-                                          <p:spTgt spid="4"/>
+                                          <p:spTgt spid="13"/>
                                         </p:tgtEl>
                                         <p:attrNameLst>
                                           <p:attrName>style.visibility</p:attrName>
@@ -11106,7 +11540,7 @@
                                           </p:stCondLst>
                                         </p:cTn>
                                         <p:tgtEl>
-                                          <p:spTgt spid="5"/>
+                                          <p:spTgt spid="19"/>
                                         </p:tgtEl>
                                         <p:attrNameLst>
                                           <p:attrName>style.visibility</p:attrName>
@@ -11191,15 +11625,33 @@
                                   </p:childTnLst>
                                 </p:cTn>
                               </p:par>
+                            </p:childTnLst>
+                          </p:cTn>
+                        </p:par>
+                      </p:childTnLst>
+                    </p:cTn>
+                  </p:par>
+                  <p:par>
+                    <p:cTn id="15" fill="hold">
+                      <p:stCondLst>
+                        <p:cond delay="indefinite"/>
+                      </p:stCondLst>
+                      <p:childTnLst>
+                        <p:par>
+                          <p:cTn id="16" fill="hold">
+                            <p:stCondLst>
+                              <p:cond delay="0"/>
+                            </p:stCondLst>
+                            <p:childTnLst>
                               <p:par>
-                                <p:cTn id="15" presetID="1" presetClass="entr" presetSubtype="0" fill="hold" grpId="0" nodeType="withEffect">
+                                <p:cTn id="17" presetID="1" presetClass="entr" presetSubtype="0" fill="hold" grpId="0" nodeType="clickEffect">
                                   <p:stCondLst>
                                     <p:cond delay="0"/>
                                   </p:stCondLst>
                                   <p:childTnLst>
                                     <p:set>
                                       <p:cBhvr>
-                                        <p:cTn id="16" dur="1" fill="hold">
+                                        <p:cTn id="18" dur="1" fill="hold">
                                           <p:stCondLst>
                                             <p:cond delay="0"/>
                                           </p:stCondLst>
@@ -11225,46 +11677,19 @@
                     </p:cTn>
                   </p:par>
                   <p:par>
-                    <p:cTn id="17" fill="hold">
+                    <p:cTn id="19" fill="hold">
                       <p:stCondLst>
                         <p:cond delay="indefinite"/>
                       </p:stCondLst>
                       <p:childTnLst>
                         <p:par>
-                          <p:cTn id="18" fill="hold">
+                          <p:cTn id="20" fill="hold">
                             <p:stCondLst>
                               <p:cond delay="0"/>
                             </p:stCondLst>
                             <p:childTnLst>
                               <p:par>
-                                <p:cTn id="19" presetID="1" presetClass="entr" presetSubtype="0" fill="hold" grpId="0" nodeType="clickEffect">
-                                  <p:stCondLst>
-                                    <p:cond delay="0"/>
-                                  </p:stCondLst>
-                                  <p:childTnLst>
-                                    <p:set>
-                                      <p:cBhvr>
-                                        <p:cTn id="20" dur="1" fill="hold">
-                                          <p:stCondLst>
-                                            <p:cond delay="0"/>
-                                          </p:stCondLst>
-                                        </p:cTn>
-                                        <p:tgtEl>
-                                          <p:spTgt spid="12"/>
-                                        </p:tgtEl>
-                                        <p:attrNameLst>
-                                          <p:attrName>style.visibility</p:attrName>
-                                        </p:attrNameLst>
-                                      </p:cBhvr>
-                                      <p:to>
-                                        <p:strVal val="visible"/>
-                                      </p:to>
-                                    </p:set>
-                                  </p:childTnLst>
-                                </p:cTn>
-                              </p:par>
-                              <p:par>
-                                <p:cTn id="21" presetID="1" presetClass="entr" presetSubtype="0" fill="hold" grpId="0" nodeType="withEffect">
+                                <p:cTn id="21" presetID="1" presetClass="entr" presetSubtype="0" fill="hold" grpId="0" nodeType="clickEffect">
                                   <p:stCondLst>
                                     <p:cond delay="0"/>
                                   </p:stCondLst>
@@ -11277,7 +11702,7 @@
                                           </p:stCondLst>
                                         </p:cTn>
                                         <p:tgtEl>
-                                          <p:spTgt spid="16"/>
+                                          <p:spTgt spid="12"/>
                                         </p:tgtEl>
                                         <p:attrNameLst>
                                           <p:attrName>style.visibility</p:attrName>
@@ -11304,7 +11729,7 @@
                                           </p:stCondLst>
                                         </p:cTn>
                                         <p:tgtEl>
-                                          <p:spTgt spid="8"/>
+                                          <p:spTgt spid="16"/>
                                         </p:tgtEl>
                                         <p:attrNameLst>
                                           <p:attrName>style.visibility</p:attrName>
@@ -11326,6 +11751,33 @@
                                     <p:set>
                                       <p:cBhvr>
                                         <p:cTn id="26" dur="1" fill="hold">
+                                          <p:stCondLst>
+                                            <p:cond delay="0"/>
+                                          </p:stCondLst>
+                                        </p:cTn>
+                                        <p:tgtEl>
+                                          <p:spTgt spid="8"/>
+                                        </p:tgtEl>
+                                        <p:attrNameLst>
+                                          <p:attrName>style.visibility</p:attrName>
+                                        </p:attrNameLst>
+                                      </p:cBhvr>
+                                      <p:to>
+                                        <p:strVal val="visible"/>
+                                      </p:to>
+                                    </p:set>
+                                  </p:childTnLst>
+                                </p:cTn>
+                              </p:par>
+                              <p:par>
+                                <p:cTn id="27" presetID="1" presetClass="entr" presetSubtype="0" fill="hold" grpId="0" nodeType="withEffect">
+                                  <p:stCondLst>
+                                    <p:cond delay="0"/>
+                                  </p:stCondLst>
+                                  <p:childTnLst>
+                                    <p:set>
+                                      <p:cBhvr>
+                                        <p:cTn id="28" dur="1" fill="hold">
                                           <p:stCondLst>
                                             <p:cond delay="0"/>
                                           </p:stCondLst>
@@ -33935,7 +34387,7 @@
                 <a:ea typeface="Karla"/>
                 <a:sym typeface="Karla"/>
               </a:rPr>
-              <a:t>UR=2 (both with MOF 16x) </a:t>
+              <a:t>UR=2 (both with MAF 16x) </a:t>
             </a:r>
           </a:p>
           <a:p>
@@ -34021,66 +34473,6 @@
           </a:p>
         </p:txBody>
       </p:sp>
-      <p:pic>
-        <p:nvPicPr>
-          <p:cNvPr id="7" name="Picture 6"/>
-          <p:cNvPicPr>
-            <a:picLocks noChangeAspect="1"/>
-          </p:cNvPicPr>
-          <p:nvPr/>
-        </p:nvPicPr>
-        <p:blipFill>
-          <a:blip r:embed="rId3">
-            <a:extLst>
-              <a:ext uri="{28A0092B-C50C-407E-A947-70E740481C1C}">
-                <a14:useLocalDpi xmlns:a14="http://schemas.microsoft.com/office/drawing/2010/main" val="0"/>
-              </a:ext>
-            </a:extLst>
-          </a:blip>
-          <a:stretch>
-            <a:fillRect/>
-          </a:stretch>
-        </p:blipFill>
-        <p:spPr>
-          <a:xfrm>
-            <a:off x="1343577" y="3508366"/>
-            <a:ext cx="3867937" cy="2900952"/>
-          </a:xfrm>
-          <a:prstGeom prst="rect">
-            <a:avLst/>
-          </a:prstGeom>
-        </p:spPr>
-      </p:pic>
-      <p:pic>
-        <p:nvPicPr>
-          <p:cNvPr id="8" name="Picture 7"/>
-          <p:cNvPicPr>
-            <a:picLocks noChangeAspect="1"/>
-          </p:cNvPicPr>
-          <p:nvPr/>
-        </p:nvPicPr>
-        <p:blipFill>
-          <a:blip r:embed="rId4">
-            <a:extLst>
-              <a:ext uri="{28A0092B-C50C-407E-A947-70E740481C1C}">
-                <a14:useLocalDpi xmlns:a14="http://schemas.microsoft.com/office/drawing/2010/main" val="0"/>
-              </a:ext>
-            </a:extLst>
-          </a:blip>
-          <a:stretch>
-            <a:fillRect/>
-          </a:stretch>
-        </p:blipFill>
-        <p:spPr>
-          <a:xfrm>
-            <a:off x="4937759" y="3475659"/>
-            <a:ext cx="3867937" cy="2900952"/>
-          </a:xfrm>
-          <a:prstGeom prst="rect">
-            <a:avLst/>
-          </a:prstGeom>
-        </p:spPr>
-      </p:pic>
       <p:graphicFrame>
         <p:nvGraphicFramePr>
           <p:cNvPr id="9" name="Table 8"/>
@@ -34090,7 +34482,7 @@
           <p:nvPr>
             <p:extLst>
               <p:ext uri="{D42A27DB-BD31-4B8C-83A1-F6EECF244321}">
-                <p14:modId xmlns:p14="http://schemas.microsoft.com/office/powerpoint/2010/main" val="2354138619"/>
+                <p14:modId xmlns:p14="http://schemas.microsoft.com/office/powerpoint/2010/main" val="1321823686"/>
               </p:ext>
             </p:extLst>
           </p:nvPr>
@@ -34282,15 +34674,22 @@
                     <a:p>
                       <a:pPr algn="l" fontAlgn="b"/>
                       <a:r>
-                        <a:rPr lang="en-US" sz="1300" b="1" i="0" u="none" strike="noStrike">
+                        <a:rPr lang="en-US" sz="1300" b="1" i="0" u="none" strike="noStrike" dirty="0" smtClean="0">
                           <a:solidFill>
                             <a:srgbClr val="000000"/>
                           </a:solidFill>
                           <a:effectLst/>
                           <a:latin typeface="Calibri" panose="020F0502020204030204" pitchFamily="34" charset="0"/>
                         </a:rPr>
-                        <a:t>MOF</a:t>
+                        <a:t>MAF</a:t>
                       </a:r>
+                      <a:endParaRPr lang="en-US" sz="1300" b="1" i="0" u="none" strike="noStrike" dirty="0">
+                        <a:solidFill>
+                          <a:srgbClr val="000000"/>
+                        </a:solidFill>
+                        <a:effectLst/>
+                        <a:latin typeface="Calibri" panose="020F0502020204030204" pitchFamily="34" charset="0"/>
+                      </a:endParaRPr>
                     </a:p>
                   </a:txBody>
                   <a:tcPr marL="11430" marR="11430" marT="11430" marB="0" anchor="b">
@@ -34448,7 +34847,7 @@
                     <a:p>
                       <a:pPr algn="l" fontAlgn="b"/>
                       <a:r>
-                        <a:rPr lang="el-GR" sz="1300" b="1" i="0" u="none" strike="noStrike">
+                        <a:rPr lang="el-GR" sz="1300" b="1" i="0" u="none" strike="noStrike" dirty="0">
                           <a:solidFill>
                             <a:srgbClr val="000000"/>
                           </a:solidFill>
@@ -34998,6 +35397,286 @@
           </a:p>
         </p:txBody>
       </p:sp>
+      <p:grpSp>
+        <p:nvGrpSpPr>
+          <p:cNvPr id="4" name="Group 3"/>
+          <p:cNvGrpSpPr/>
+          <p:nvPr/>
+        </p:nvGrpSpPr>
+        <p:grpSpPr>
+          <a:xfrm>
+            <a:off x="1343577" y="3508366"/>
+            <a:ext cx="3867937" cy="2900952"/>
+            <a:chOff x="1343577" y="3508366"/>
+            <a:chExt cx="3867937" cy="2900952"/>
+          </a:xfrm>
+        </p:grpSpPr>
+        <p:pic>
+          <p:nvPicPr>
+            <p:cNvPr id="7" name="Picture 6"/>
+            <p:cNvPicPr>
+              <a:picLocks noChangeAspect="1"/>
+            </p:cNvPicPr>
+            <p:nvPr/>
+          </p:nvPicPr>
+          <p:blipFill>
+            <a:blip r:embed="rId3">
+              <a:extLst>
+                <a:ext uri="{28A0092B-C50C-407E-A947-70E740481C1C}">
+                  <a14:useLocalDpi xmlns:a14="http://schemas.microsoft.com/office/drawing/2010/main" val="0"/>
+                </a:ext>
+              </a:extLst>
+            </a:blip>
+            <a:stretch>
+              <a:fillRect/>
+            </a:stretch>
+          </p:blipFill>
+          <p:spPr>
+            <a:xfrm>
+              <a:off x="1343577" y="3508366"/>
+              <a:ext cx="3867937" cy="2900952"/>
+            </a:xfrm>
+            <a:prstGeom prst="rect">
+              <a:avLst/>
+            </a:prstGeom>
+          </p:spPr>
+        </p:pic>
+        <p:sp>
+          <p:nvSpPr>
+            <p:cNvPr id="11" name="Rectangle 10"/>
+            <p:cNvSpPr/>
+            <p:nvPr/>
+          </p:nvSpPr>
+          <p:spPr>
+            <a:xfrm>
+              <a:off x="1761219" y="3543191"/>
+              <a:ext cx="2888633" cy="179295"/>
+            </a:xfrm>
+            <a:prstGeom prst="rect">
+              <a:avLst/>
+            </a:prstGeom>
+            <a:solidFill>
+              <a:schemeClr val="bg1"/>
+            </a:solidFill>
+            <a:ln>
+              <a:noFill/>
+            </a:ln>
+          </p:spPr>
+          <p:style>
+            <a:lnRef idx="2">
+              <a:schemeClr val="accent1">
+                <a:shade val="50000"/>
+              </a:schemeClr>
+            </a:lnRef>
+            <a:fillRef idx="1">
+              <a:schemeClr val="accent1"/>
+            </a:fillRef>
+            <a:effectRef idx="0">
+              <a:schemeClr val="accent1"/>
+            </a:effectRef>
+            <a:fontRef idx="minor">
+              <a:schemeClr val="lt1"/>
+            </a:fontRef>
+          </p:style>
+          <p:txBody>
+            <a:bodyPr rtlCol="0" anchor="ctr"/>
+            <a:lstStyle/>
+            <a:p>
+              <a:pPr algn="ctr"/>
+              <a:r>
+                <a:rPr lang="en-US" sz="1000" b="1" dirty="0" smtClean="0">
+                  <a:solidFill>
+                    <a:schemeClr val="tx1">
+                      <a:lumMod val="75000"/>
+                      <a:lumOff val="25000"/>
+                    </a:schemeClr>
+                  </a:solidFill>
+                </a:rPr>
+                <a:t>Simulink: UR=2 with MAF, </a:t>
+              </a:r>
+              <a:r>
+                <a:rPr lang="el-GR" sz="1000" b="1" i="0" u="none" strike="noStrike" dirty="0" smtClean="0">
+                  <a:solidFill>
+                    <a:srgbClr val="000000"/>
+                  </a:solidFill>
+                  <a:effectLst/>
+                  <a:latin typeface="Calibri" panose="020F0502020204030204" pitchFamily="34" charset="0"/>
+                </a:rPr>
+                <a:t>α</a:t>
+              </a:r>
+              <a:r>
+                <a:rPr lang="en-US" sz="1000" b="1" i="0" u="none" strike="noStrike" dirty="0" smtClean="0">
+                  <a:solidFill>
+                    <a:srgbClr val="000000"/>
+                  </a:solidFill>
+                  <a:effectLst/>
+                  <a:latin typeface="Calibri" panose="020F0502020204030204" pitchFamily="34" charset="0"/>
+                </a:rPr>
+                <a:t>=0.2</a:t>
+              </a:r>
+              <a:r>
+                <a:rPr lang="en-US" sz="1000" b="1" dirty="0" smtClean="0">
+                  <a:solidFill>
+                    <a:schemeClr val="tx1">
+                      <a:lumMod val="75000"/>
+                      <a:lumOff val="25000"/>
+                    </a:schemeClr>
+                  </a:solidFill>
+                </a:rPr>
+                <a:t> </a:t>
+              </a:r>
+              <a:endParaRPr lang="en-US" sz="1000" b="1" dirty="0">
+                <a:solidFill>
+                  <a:schemeClr val="tx1">
+                    <a:lumMod val="75000"/>
+                    <a:lumOff val="25000"/>
+                  </a:schemeClr>
+                </a:solidFill>
+              </a:endParaRPr>
+            </a:p>
+          </p:txBody>
+        </p:sp>
+      </p:grpSp>
+      <p:grpSp>
+        <p:nvGrpSpPr>
+          <p:cNvPr id="5" name="Group 4"/>
+          <p:cNvGrpSpPr/>
+          <p:nvPr/>
+        </p:nvGrpSpPr>
+        <p:grpSpPr>
+          <a:xfrm>
+            <a:off x="4937759" y="3475659"/>
+            <a:ext cx="3867937" cy="2900952"/>
+            <a:chOff x="4937759" y="3475659"/>
+            <a:chExt cx="3867937" cy="2900952"/>
+          </a:xfrm>
+        </p:grpSpPr>
+        <p:pic>
+          <p:nvPicPr>
+            <p:cNvPr id="8" name="Picture 7"/>
+            <p:cNvPicPr>
+              <a:picLocks noChangeAspect="1"/>
+            </p:cNvPicPr>
+            <p:nvPr/>
+          </p:nvPicPr>
+          <p:blipFill>
+            <a:blip r:embed="rId4">
+              <a:extLst>
+                <a:ext uri="{28A0092B-C50C-407E-A947-70E740481C1C}">
+                  <a14:useLocalDpi xmlns:a14="http://schemas.microsoft.com/office/drawing/2010/main" val="0"/>
+                </a:ext>
+              </a:extLst>
+            </a:blip>
+            <a:stretch>
+              <a:fillRect/>
+            </a:stretch>
+          </p:blipFill>
+          <p:spPr>
+            <a:xfrm>
+              <a:off x="4937759" y="3475659"/>
+              <a:ext cx="3867937" cy="2900952"/>
+            </a:xfrm>
+            <a:prstGeom prst="rect">
+              <a:avLst/>
+            </a:prstGeom>
+          </p:spPr>
+        </p:pic>
+        <p:sp>
+          <p:nvSpPr>
+            <p:cNvPr id="12" name="Rectangle 11"/>
+            <p:cNvSpPr/>
+            <p:nvPr/>
+          </p:nvSpPr>
+          <p:spPr>
+            <a:xfrm>
+              <a:off x="5391188" y="3499632"/>
+              <a:ext cx="2888633" cy="179295"/>
+            </a:xfrm>
+            <a:prstGeom prst="rect">
+              <a:avLst/>
+            </a:prstGeom>
+            <a:solidFill>
+              <a:schemeClr val="bg1"/>
+            </a:solidFill>
+            <a:ln>
+              <a:noFill/>
+            </a:ln>
+          </p:spPr>
+          <p:style>
+            <a:lnRef idx="2">
+              <a:schemeClr val="accent1">
+                <a:shade val="50000"/>
+              </a:schemeClr>
+            </a:lnRef>
+            <a:fillRef idx="1">
+              <a:schemeClr val="accent1"/>
+            </a:fillRef>
+            <a:effectRef idx="0">
+              <a:schemeClr val="accent1"/>
+            </a:effectRef>
+            <a:fontRef idx="minor">
+              <a:schemeClr val="lt1"/>
+            </a:fontRef>
+          </p:style>
+          <p:txBody>
+            <a:bodyPr rtlCol="0" anchor="ctr"/>
+            <a:lstStyle/>
+            <a:p>
+              <a:pPr algn="ctr"/>
+              <a:r>
+                <a:rPr lang="en-US" sz="1000" b="1" dirty="0" smtClean="0">
+                  <a:solidFill>
+                    <a:schemeClr val="tx1">
+                      <a:lumMod val="75000"/>
+                      <a:lumOff val="25000"/>
+                    </a:schemeClr>
+                  </a:solidFill>
+                </a:rPr>
+                <a:t>Simulink: UR=8 with MAF, </a:t>
+              </a:r>
+              <a:r>
+                <a:rPr lang="el-GR" sz="1000" b="1" i="0" u="none" strike="noStrike" dirty="0" smtClean="0">
+                  <a:solidFill>
+                    <a:srgbClr val="000000"/>
+                  </a:solidFill>
+                  <a:effectLst/>
+                  <a:latin typeface="Calibri" panose="020F0502020204030204" pitchFamily="34" charset="0"/>
+                </a:rPr>
+                <a:t>α</a:t>
+              </a:r>
+              <a:r>
+                <a:rPr lang="en-US" sz="1000" b="1" i="0" u="none" strike="noStrike" dirty="0" smtClean="0">
+                  <a:solidFill>
+                    <a:srgbClr val="000000"/>
+                  </a:solidFill>
+                  <a:effectLst/>
+                  <a:latin typeface="Calibri" panose="020F0502020204030204" pitchFamily="34" charset="0"/>
+                </a:rPr>
+                <a:t>=0.087</a:t>
+              </a:r>
+              <a:r>
+                <a:rPr lang="en-US" sz="1000" b="1" dirty="0" smtClean="0">
+                  <a:solidFill>
+                    <a:schemeClr val="tx1">
+                      <a:lumMod val="75000"/>
+                      <a:lumOff val="25000"/>
+                    </a:schemeClr>
+                  </a:solidFill>
+                </a:rPr>
+                <a:t> </a:t>
+              </a:r>
+              <a:endParaRPr lang="en-US" sz="1000" b="1" dirty="0">
+                <a:solidFill>
+                  <a:schemeClr val="tx1">
+                    <a:lumMod val="75000"/>
+                    <a:lumOff val="25000"/>
+                  </a:schemeClr>
+                </a:solidFill>
+              </a:endParaRPr>
+            </a:p>
+          </p:txBody>
+        </p:sp>
+      </p:grpSp>
     </p:spTree>
     <p:extLst>
       <p:ext uri="{BB962C8B-B14F-4D97-AF65-F5344CB8AC3E}">

</xml_diff>